<commit_message>
added icons, wip, problem with loading, takes too long time
</commit_message>
<xml_diff>
--- a/Documentation/Prezentare.pptx
+++ b/Documentation/Prezentare.pptx
@@ -29,14 +29,14 @@
   <p:notesSz cx="6858000" cy="9144000"/>
   <p:embeddedFontLst>
     <p:embeddedFont>
-      <p:font typeface="Lato" panose="020B0604020202020204" charset="0"/>
+      <p:font typeface="Raleway" panose="020B0604020202020204" charset="0"/>
       <p:regular r:id="rId19"/>
       <p:bold r:id="rId20"/>
       <p:italic r:id="rId21"/>
       <p:boldItalic r:id="rId22"/>
     </p:embeddedFont>
     <p:embeddedFont>
-      <p:font typeface="Raleway" panose="020B0604020202020204" charset="0"/>
+      <p:font typeface="Lato" panose="020B0604020202020204" charset="0"/>
       <p:regular r:id="rId23"/>
       <p:bold r:id="rId24"/>
       <p:italic r:id="rId25"/>
@@ -7338,8 +7338,8 @@
         </p:nvSpPr>
         <p:spPr>
           <a:xfrm>
-            <a:off x="2787257" y="5252999"/>
-            <a:ext cx="3058104" cy="392502"/>
+            <a:off x="3035849" y="5252999"/>
+            <a:ext cx="2560920" cy="392502"/>
           </a:xfrm>
           <a:prstGeom prst="rect">
             <a:avLst/>
@@ -7602,8 +7602,8 @@
           </a:lstStyle>
           <a:p>
             <a:r>
-              <a:rPr lang="ro-RO" sz="1800" dirty="0" smtClean="0"/>
-              <a:t>Absolvent</a:t>
+              <a:rPr lang="en-US" sz="1800" dirty="0" err="1" smtClean="0"/>
+              <a:t>Autor</a:t>
             </a:r>
             <a:r>
               <a:rPr lang="en-US" sz="1800" dirty="0" smtClean="0"/>
@@ -16131,7 +16131,6 @@
               <a:rPr lang="ro-RO" sz="2000" i="0" dirty="0"/>
               <a:t>pentru limba japoneză, care să structureze într-un mod eficient toată informația (vocabularul, gramatica și citirea)</a:t>
             </a:r>
-            <a:endParaRPr lang="ro-RO" sz="2000" i="0" dirty="0"/>
           </a:p>
         </p:txBody>
       </p:sp>
@@ -16417,7 +16416,6 @@
               <a:rPr lang="ro-RO" sz="2000" i="0" dirty="0"/>
               <a:t>spațiat de repetiție (SRS ), folosit pentru învățarea vocabularului</a:t>
             </a:r>
-            <a:endParaRPr lang="ro-RO" sz="2000" i="0" dirty="0"/>
           </a:p>
         </p:txBody>
       </p:sp>

</xml_diff>